<commit_message>
lots of work not pushed scripts and plots oops
</commit_message>
<xml_diff>
--- a/Analysis/editingplots.pptx
+++ b/Analysis/editingplots.pptx
@@ -6,6 +6,8 @@
   </p:sldMasterIdLst>
   <p:sldIdLst>
     <p:sldId id="256" r:id="rId2"/>
+    <p:sldId id="257" r:id="rId3"/>
+    <p:sldId id="258" r:id="rId4"/>
   </p:sldIdLst>
   <p:sldSz cx="12192000" cy="6858000"/>
   <p:notesSz cx="6858000" cy="9144000"/>
@@ -104,13 +106,18 @@
       </a:defRPr>
     </a:lvl9pPr>
   </p:defaultTextStyle>
+  <p:extLst>
+    <p:ext uri="{EFAFB233-063F-42B5-8137-9DF3F51BA10A}">
+      <p15:sldGuideLst xmlns:p15="http://schemas.microsoft.com/office/powerpoint/2012/main"/>
+    </p:ext>
+  </p:extLst>
 </p:presentation>
 </file>
 
 <file path=ppt/revisionInfo.xml><?xml version="1.0" encoding="utf-8"?>
 <p1510:revInfo xmlns:a="http://schemas.openxmlformats.org/drawingml/2006/main" xmlns:r="http://schemas.openxmlformats.org/officeDocument/2006/relationships" xmlns:p1510="http://schemas.microsoft.com/office/powerpoint/2015/10/main">
   <p1510:revLst>
-    <p1510:client id="{E58C2093-57B6-4021-8C3A-A0D9380A847A}" v="14" dt="2024-04-03T16:18:34.793"/>
+    <p1510:client id="{E58C2093-57B6-4021-8C3A-A0D9380A847A}" v="43" dt="2024-04-11T18:39:50.130"/>
   </p1510:revLst>
 </p1510:revInfo>
 </file>
@@ -119,8 +126,8 @@
 <pc:chgInfo xmlns:a="http://schemas.openxmlformats.org/drawingml/2006/main" xmlns:r="http://schemas.openxmlformats.org/officeDocument/2006/relationships" xmlns:ac="http://schemas.microsoft.com/office/drawing/2013/main/command" xmlns:pc="http://schemas.microsoft.com/office/powerpoint/2013/main/command">
   <pc:docChgLst>
     <pc:chgData name="Deegan, Eva S" userId="ae3b14c2-f29a-4e9c-95fa-aa21238c8fd4" providerId="ADAL" clId="{E58C2093-57B6-4021-8C3A-A0D9380A847A}"/>
-    <pc:docChg chg="undo custSel modSld">
-      <pc:chgData name="Deegan, Eva S" userId="ae3b14c2-f29a-4e9c-95fa-aa21238c8fd4" providerId="ADAL" clId="{E58C2093-57B6-4021-8C3A-A0D9380A847A}" dt="2024-04-03T16:18:34.793" v="53" actId="14826"/>
+    <pc:docChg chg="undo custSel addSld modSld">
+      <pc:chgData name="Deegan, Eva S" userId="ae3b14c2-f29a-4e9c-95fa-aa21238c8fd4" providerId="ADAL" clId="{E58C2093-57B6-4021-8C3A-A0D9380A847A}" dt="2024-04-11T18:40:09.653" v="276" actId="1076"/>
       <pc:docMkLst>
         <pc:docMk/>
       </pc:docMkLst>
@@ -219,6 +226,236 @@
           </ac:picMkLst>
         </pc:picChg>
       </pc:sldChg>
+      <pc:sldChg chg="addSp delSp modSp new mod">
+        <pc:chgData name="Deegan, Eva S" userId="ae3b14c2-f29a-4e9c-95fa-aa21238c8fd4" providerId="ADAL" clId="{E58C2093-57B6-4021-8C3A-A0D9380A847A}" dt="2024-04-11T18:37:23.669" v="223" actId="1076"/>
+        <pc:sldMkLst>
+          <pc:docMk/>
+          <pc:sldMk cId="342745335" sldId="257"/>
+        </pc:sldMkLst>
+        <pc:spChg chg="add mod">
+          <ac:chgData name="Deegan, Eva S" userId="ae3b14c2-f29a-4e9c-95fa-aa21238c8fd4" providerId="ADAL" clId="{E58C2093-57B6-4021-8C3A-A0D9380A847A}" dt="2024-04-11T18:05:48.662" v="197" actId="1076"/>
+          <ac:spMkLst>
+            <pc:docMk/>
+            <pc:sldMk cId="342745335" sldId="257"/>
+            <ac:spMk id="4" creationId="{3329508D-306F-FED8-4AA0-BBC25E6D7F28}"/>
+          </ac:spMkLst>
+        </pc:spChg>
+        <pc:spChg chg="add mod">
+          <ac:chgData name="Deegan, Eva S" userId="ae3b14c2-f29a-4e9c-95fa-aa21238c8fd4" providerId="ADAL" clId="{E58C2093-57B6-4021-8C3A-A0D9380A847A}" dt="2024-04-11T17:57:15.400" v="141" actId="1076"/>
+          <ac:spMkLst>
+            <pc:docMk/>
+            <pc:sldMk cId="342745335" sldId="257"/>
+            <ac:spMk id="5" creationId="{51FAC376-B3E3-CE58-81F1-FEBDB7B6B1E8}"/>
+          </ac:spMkLst>
+        </pc:spChg>
+        <pc:spChg chg="add mod">
+          <ac:chgData name="Deegan, Eva S" userId="ae3b14c2-f29a-4e9c-95fa-aa21238c8fd4" providerId="ADAL" clId="{E58C2093-57B6-4021-8C3A-A0D9380A847A}" dt="2024-04-11T18:03:50.264" v="174" actId="1076"/>
+          <ac:spMkLst>
+            <pc:docMk/>
+            <pc:sldMk cId="342745335" sldId="257"/>
+            <ac:spMk id="6" creationId="{4B4BAF50-9A65-EBD8-D980-34AB2F9295DD}"/>
+          </ac:spMkLst>
+        </pc:spChg>
+        <pc:spChg chg="add mod">
+          <ac:chgData name="Deegan, Eva S" userId="ae3b14c2-f29a-4e9c-95fa-aa21238c8fd4" providerId="ADAL" clId="{E58C2093-57B6-4021-8C3A-A0D9380A847A}" dt="2024-04-11T18:04:00.408" v="176" actId="1076"/>
+          <ac:spMkLst>
+            <pc:docMk/>
+            <pc:sldMk cId="342745335" sldId="257"/>
+            <ac:spMk id="7" creationId="{5A3554D5-328E-8E2D-95FA-34B66B4A7190}"/>
+          </ac:spMkLst>
+        </pc:spChg>
+        <pc:spChg chg="add del mod">
+          <ac:chgData name="Deegan, Eva S" userId="ae3b14c2-f29a-4e9c-95fa-aa21238c8fd4" providerId="ADAL" clId="{E58C2093-57B6-4021-8C3A-A0D9380A847A}" dt="2024-04-11T17:26:38.026" v="102" actId="478"/>
+          <ac:spMkLst>
+            <pc:docMk/>
+            <pc:sldMk cId="342745335" sldId="257"/>
+            <ac:spMk id="8" creationId="{DDE6E242-E4A0-35C8-69A8-D75728BBA27E}"/>
+          </ac:spMkLst>
+        </pc:spChg>
+        <pc:spChg chg="add del mod">
+          <ac:chgData name="Deegan, Eva S" userId="ae3b14c2-f29a-4e9c-95fa-aa21238c8fd4" providerId="ADAL" clId="{E58C2093-57B6-4021-8C3A-A0D9380A847A}" dt="2024-04-11T17:26:40.905" v="103" actId="478"/>
+          <ac:spMkLst>
+            <pc:docMk/>
+            <pc:sldMk cId="342745335" sldId="257"/>
+            <ac:spMk id="9" creationId="{6F4863E6-8D8F-8451-282A-77DDFE63E1E2}"/>
+          </ac:spMkLst>
+        </pc:spChg>
+        <pc:spChg chg="add mod">
+          <ac:chgData name="Deegan, Eva S" userId="ae3b14c2-f29a-4e9c-95fa-aa21238c8fd4" providerId="ADAL" clId="{E58C2093-57B6-4021-8C3A-A0D9380A847A}" dt="2024-04-11T18:04:09.449" v="178" actId="1076"/>
+          <ac:spMkLst>
+            <pc:docMk/>
+            <pc:sldMk cId="342745335" sldId="257"/>
+            <ac:spMk id="10" creationId="{08E5834A-762C-C97E-6C17-126C4BD7BA1A}"/>
+          </ac:spMkLst>
+        </pc:spChg>
+        <pc:spChg chg="add mod">
+          <ac:chgData name="Deegan, Eva S" userId="ae3b14c2-f29a-4e9c-95fa-aa21238c8fd4" providerId="ADAL" clId="{E58C2093-57B6-4021-8C3A-A0D9380A847A}" dt="2024-04-11T17:27:52.530" v="136" actId="1076"/>
+          <ac:spMkLst>
+            <pc:docMk/>
+            <pc:sldMk cId="342745335" sldId="257"/>
+            <ac:spMk id="13" creationId="{708BD760-456F-CD60-7D32-3CF4274E05B9}"/>
+          </ac:spMkLst>
+        </pc:spChg>
+        <pc:spChg chg="add mod">
+          <ac:chgData name="Deegan, Eva S" userId="ae3b14c2-f29a-4e9c-95fa-aa21238c8fd4" providerId="ADAL" clId="{E58C2093-57B6-4021-8C3A-A0D9380A847A}" dt="2024-04-11T18:37:23.669" v="223" actId="1076"/>
+          <ac:spMkLst>
+            <pc:docMk/>
+            <pc:sldMk cId="342745335" sldId="257"/>
+            <ac:spMk id="16" creationId="{49A9FDCD-E610-AF2D-BD35-9808F883D089}"/>
+          </ac:spMkLst>
+        </pc:spChg>
+        <pc:spChg chg="add mod">
+          <ac:chgData name="Deegan, Eva S" userId="ae3b14c2-f29a-4e9c-95fa-aa21238c8fd4" providerId="ADAL" clId="{E58C2093-57B6-4021-8C3A-A0D9380A847A}" dt="2024-04-11T18:05:00.160" v="196" actId="1076"/>
+          <ac:spMkLst>
+            <pc:docMk/>
+            <pc:sldMk cId="342745335" sldId="257"/>
+            <ac:spMk id="17" creationId="{22A413F6-5F2F-1285-1955-26C0F36AB41B}"/>
+          </ac:spMkLst>
+        </pc:spChg>
+        <pc:picChg chg="add mod modCrop">
+          <ac:chgData name="Deegan, Eva S" userId="ae3b14c2-f29a-4e9c-95fa-aa21238c8fd4" providerId="ADAL" clId="{E58C2093-57B6-4021-8C3A-A0D9380A847A}" dt="2024-04-11T18:02:39.688" v="165" actId="732"/>
+          <ac:picMkLst>
+            <pc:docMk/>
+            <pc:sldMk cId="342745335" sldId="257"/>
+            <ac:picMk id="3" creationId="{E5183A98-1FE4-4491-99B2-B6AFB6E47DF4}"/>
+          </ac:picMkLst>
+        </pc:picChg>
+        <pc:picChg chg="add mod ord modCrop">
+          <ac:chgData name="Deegan, Eva S" userId="ae3b14c2-f29a-4e9c-95fa-aa21238c8fd4" providerId="ADAL" clId="{E58C2093-57B6-4021-8C3A-A0D9380A847A}" dt="2024-04-11T18:02:44.692" v="166" actId="167"/>
+          <ac:picMkLst>
+            <pc:docMk/>
+            <pc:sldMk cId="342745335" sldId="257"/>
+            <ac:picMk id="14" creationId="{79DF00AC-798B-DA58-3501-283A44C603DA}"/>
+          </ac:picMkLst>
+        </pc:picChg>
+        <pc:picChg chg="add mod ord modCrop">
+          <ac:chgData name="Deegan, Eva S" userId="ae3b14c2-f29a-4e9c-95fa-aa21238c8fd4" providerId="ADAL" clId="{E58C2093-57B6-4021-8C3A-A0D9380A847A}" dt="2024-04-11T18:07:07.337" v="198" actId="1036"/>
+          <ac:picMkLst>
+            <pc:docMk/>
+            <pc:sldMk cId="342745335" sldId="257"/>
+            <ac:picMk id="15" creationId="{7646A4C5-60E3-3CE2-8539-A6164495BD32}"/>
+          </ac:picMkLst>
+        </pc:picChg>
+        <pc:cxnChg chg="add mod">
+          <ac:chgData name="Deegan, Eva S" userId="ae3b14c2-f29a-4e9c-95fa-aa21238c8fd4" providerId="ADAL" clId="{E58C2093-57B6-4021-8C3A-A0D9380A847A}" dt="2024-04-11T18:02:39.688" v="165" actId="732"/>
+          <ac:cxnSpMkLst>
+            <pc:docMk/>
+            <pc:sldMk cId="342745335" sldId="257"/>
+            <ac:cxnSpMk id="12" creationId="{5CE13AF4-6640-CCB0-9007-98AF3D72B520}"/>
+          </ac:cxnSpMkLst>
+        </pc:cxnChg>
+      </pc:sldChg>
+      <pc:sldChg chg="addSp delSp modSp new mod">
+        <pc:chgData name="Deegan, Eva S" userId="ae3b14c2-f29a-4e9c-95fa-aa21238c8fd4" providerId="ADAL" clId="{E58C2093-57B6-4021-8C3A-A0D9380A847A}" dt="2024-04-11T18:40:09.653" v="276" actId="1076"/>
+        <pc:sldMkLst>
+          <pc:docMk/>
+          <pc:sldMk cId="2843270418" sldId="258"/>
+        </pc:sldMkLst>
+        <pc:spChg chg="add mod">
+          <ac:chgData name="Deegan, Eva S" userId="ae3b14c2-f29a-4e9c-95fa-aa21238c8fd4" providerId="ADAL" clId="{E58C2093-57B6-4021-8C3A-A0D9380A847A}" dt="2024-04-11T18:38:08.102" v="233" actId="1076"/>
+          <ac:spMkLst>
+            <pc:docMk/>
+            <pc:sldMk cId="2843270418" sldId="258"/>
+            <ac:spMk id="6" creationId="{29078BEE-41E1-F912-CF47-777A87313178}"/>
+          </ac:spMkLst>
+        </pc:spChg>
+        <pc:spChg chg="add mod">
+          <ac:chgData name="Deegan, Eva S" userId="ae3b14c2-f29a-4e9c-95fa-aa21238c8fd4" providerId="ADAL" clId="{E58C2093-57B6-4021-8C3A-A0D9380A847A}" dt="2024-04-11T18:37:56.877" v="229" actId="1076"/>
+          <ac:spMkLst>
+            <pc:docMk/>
+            <pc:sldMk cId="2843270418" sldId="258"/>
+            <ac:spMk id="7" creationId="{80E8490C-D853-38C2-D50C-C94593526263}"/>
+          </ac:spMkLst>
+        </pc:spChg>
+        <pc:spChg chg="add del mod">
+          <ac:chgData name="Deegan, Eva S" userId="ae3b14c2-f29a-4e9c-95fa-aa21238c8fd4" providerId="ADAL" clId="{E58C2093-57B6-4021-8C3A-A0D9380A847A}" dt="2024-04-11T18:38:14.594" v="235"/>
+          <ac:spMkLst>
+            <pc:docMk/>
+            <pc:sldMk cId="2843270418" sldId="258"/>
+            <ac:spMk id="8" creationId="{1387D6B0-5CDE-BC6D-DE70-92D6BBF51A12}"/>
+          </ac:spMkLst>
+        </pc:spChg>
+        <pc:spChg chg="add mod">
+          <ac:chgData name="Deegan, Eva S" userId="ae3b14c2-f29a-4e9c-95fa-aa21238c8fd4" providerId="ADAL" clId="{E58C2093-57B6-4021-8C3A-A0D9380A847A}" dt="2024-04-11T18:38:25.253" v="238" actId="1076"/>
+          <ac:spMkLst>
+            <pc:docMk/>
+            <pc:sldMk cId="2843270418" sldId="258"/>
+            <ac:spMk id="9" creationId="{9F5F4D2A-5AB3-0AE8-1739-E804C8A57B84}"/>
+          </ac:spMkLst>
+        </pc:spChg>
+        <pc:spChg chg="add mod">
+          <ac:chgData name="Deegan, Eva S" userId="ae3b14c2-f29a-4e9c-95fa-aa21238c8fd4" providerId="ADAL" clId="{E58C2093-57B6-4021-8C3A-A0D9380A847A}" dt="2024-04-11T18:38:33.246" v="245" actId="20577"/>
+          <ac:spMkLst>
+            <pc:docMk/>
+            <pc:sldMk cId="2843270418" sldId="258"/>
+            <ac:spMk id="10" creationId="{3E28EB1E-3606-B82C-DA5A-2F4F2F811E4D}"/>
+          </ac:spMkLst>
+        </pc:spChg>
+        <pc:spChg chg="add mod">
+          <ac:chgData name="Deegan, Eva S" userId="ae3b14c2-f29a-4e9c-95fa-aa21238c8fd4" providerId="ADAL" clId="{E58C2093-57B6-4021-8C3A-A0D9380A847A}" dt="2024-04-11T18:38:54.877" v="255" actId="20577"/>
+          <ac:spMkLst>
+            <pc:docMk/>
+            <pc:sldMk cId="2843270418" sldId="258"/>
+            <ac:spMk id="11" creationId="{E4C8FAF2-5299-EEC8-A32B-D28FBF429AC4}"/>
+          </ac:spMkLst>
+        </pc:spChg>
+        <pc:spChg chg="add mod">
+          <ac:chgData name="Deegan, Eva S" userId="ae3b14c2-f29a-4e9c-95fa-aa21238c8fd4" providerId="ADAL" clId="{E58C2093-57B6-4021-8C3A-A0D9380A847A}" dt="2024-04-11T18:39:13.389" v="261" actId="20577"/>
+          <ac:spMkLst>
+            <pc:docMk/>
+            <pc:sldMk cId="2843270418" sldId="258"/>
+            <ac:spMk id="12" creationId="{666044CE-4E27-A630-7AFE-C039FC4C4033}"/>
+          </ac:spMkLst>
+        </pc:spChg>
+        <pc:spChg chg="add mod">
+          <ac:chgData name="Deegan, Eva S" userId="ae3b14c2-f29a-4e9c-95fa-aa21238c8fd4" providerId="ADAL" clId="{E58C2093-57B6-4021-8C3A-A0D9380A847A}" dt="2024-04-11T18:39:33.230" v="271" actId="20577"/>
+          <ac:spMkLst>
+            <pc:docMk/>
+            <pc:sldMk cId="2843270418" sldId="258"/>
+            <ac:spMk id="13" creationId="{00F128A9-57CD-9869-5E8F-F5BE9F457A3B}"/>
+          </ac:spMkLst>
+        </pc:spChg>
+        <pc:spChg chg="add mod">
+          <ac:chgData name="Deegan, Eva S" userId="ae3b14c2-f29a-4e9c-95fa-aa21238c8fd4" providerId="ADAL" clId="{E58C2093-57B6-4021-8C3A-A0D9380A847A}" dt="2024-04-11T18:40:09.653" v="276" actId="1076"/>
+          <ac:spMkLst>
+            <pc:docMk/>
+            <pc:sldMk cId="2843270418" sldId="258"/>
+            <ac:spMk id="15" creationId="{52F50A45-5B82-8624-F923-0AFC7D229F1B}"/>
+          </ac:spMkLst>
+        </pc:spChg>
+        <pc:picChg chg="add mod modCrop">
+          <ac:chgData name="Deegan, Eva S" userId="ae3b14c2-f29a-4e9c-95fa-aa21238c8fd4" providerId="ADAL" clId="{E58C2093-57B6-4021-8C3A-A0D9380A847A}" dt="2024-04-11T18:36:50.532" v="222" actId="34135"/>
+          <ac:picMkLst>
+            <pc:docMk/>
+            <pc:sldMk cId="2843270418" sldId="258"/>
+            <ac:picMk id="3" creationId="{98595FB7-B7C4-95A4-72EE-8ACD4411653F}"/>
+          </ac:picMkLst>
+        </pc:picChg>
+        <pc:picChg chg="add mod modCrop">
+          <ac:chgData name="Deegan, Eva S" userId="ae3b14c2-f29a-4e9c-95fa-aa21238c8fd4" providerId="ADAL" clId="{E58C2093-57B6-4021-8C3A-A0D9380A847A}" dt="2024-04-11T18:36:50.532" v="222" actId="34135"/>
+          <ac:picMkLst>
+            <pc:docMk/>
+            <pc:sldMk cId="2843270418" sldId="258"/>
+            <ac:picMk id="4" creationId="{3FE76828-6482-C5F7-9876-F1D66BAAB3CF}"/>
+          </ac:picMkLst>
+        </pc:picChg>
+        <pc:picChg chg="add mod modCrop">
+          <ac:chgData name="Deegan, Eva S" userId="ae3b14c2-f29a-4e9c-95fa-aa21238c8fd4" providerId="ADAL" clId="{E58C2093-57B6-4021-8C3A-A0D9380A847A}" dt="2024-04-11T18:36:50.532" v="222" actId="34135"/>
+          <ac:picMkLst>
+            <pc:docMk/>
+            <pc:sldMk cId="2843270418" sldId="258"/>
+            <ac:picMk id="5" creationId="{7FF53BED-13E0-32E4-203C-3189A5A9BD5F}"/>
+          </ac:picMkLst>
+        </pc:picChg>
+        <pc:cxnChg chg="add mod">
+          <ac:chgData name="Deegan, Eva S" userId="ae3b14c2-f29a-4e9c-95fa-aa21238c8fd4" providerId="ADAL" clId="{E58C2093-57B6-4021-8C3A-A0D9380A847A}" dt="2024-04-11T18:39:57.631" v="273" actId="1076"/>
+          <ac:cxnSpMkLst>
+            <pc:docMk/>
+            <pc:sldMk cId="2843270418" sldId="258"/>
+            <ac:cxnSpMk id="14" creationId="{E035A26F-9DCB-4201-8763-E95ABC72A2C4}"/>
+          </ac:cxnSpMkLst>
+        </pc:cxnChg>
+      </pc:sldChg>
     </pc:docChg>
   </pc:docChgLst>
 </pc:chgInfo>
@@ -371,7 +608,7 @@
           <a:p>
             <a:fld id="{F70EA678-BCEF-4C66-9D01-277C4F939508}" type="datetimeFigureOut">
               <a:rPr lang="en-US" smtClean="0"/>
-              <a:t>4/3/2024</a:t>
+              <a:t>4/11/2024</a:t>
             </a:fld>
             <a:endParaRPr lang="en-US" dirty="0"/>
           </a:p>
@@ -569,7 +806,7 @@
           <a:p>
             <a:fld id="{F70EA678-BCEF-4C66-9D01-277C4F939508}" type="datetimeFigureOut">
               <a:rPr lang="en-US" smtClean="0"/>
-              <a:t>4/3/2024</a:t>
+              <a:t>4/11/2024</a:t>
             </a:fld>
             <a:endParaRPr lang="en-US" dirty="0"/>
           </a:p>
@@ -777,7 +1014,7 @@
           <a:p>
             <a:fld id="{F70EA678-BCEF-4C66-9D01-277C4F939508}" type="datetimeFigureOut">
               <a:rPr lang="en-US" smtClean="0"/>
-              <a:t>4/3/2024</a:t>
+              <a:t>4/11/2024</a:t>
             </a:fld>
             <a:endParaRPr lang="en-US" dirty="0"/>
           </a:p>
@@ -975,7 +1212,7 @@
           <a:p>
             <a:fld id="{F70EA678-BCEF-4C66-9D01-277C4F939508}" type="datetimeFigureOut">
               <a:rPr lang="en-US" smtClean="0"/>
-              <a:t>4/3/2024</a:t>
+              <a:t>4/11/2024</a:t>
             </a:fld>
             <a:endParaRPr lang="en-US" dirty="0"/>
           </a:p>
@@ -1250,7 +1487,7 @@
           <a:p>
             <a:fld id="{F70EA678-BCEF-4C66-9D01-277C4F939508}" type="datetimeFigureOut">
               <a:rPr lang="en-US" smtClean="0"/>
-              <a:t>4/3/2024</a:t>
+              <a:t>4/11/2024</a:t>
             </a:fld>
             <a:endParaRPr lang="en-US" dirty="0"/>
           </a:p>
@@ -1515,7 +1752,7 @@
           <a:p>
             <a:fld id="{F70EA678-BCEF-4C66-9D01-277C4F939508}" type="datetimeFigureOut">
               <a:rPr lang="en-US" smtClean="0"/>
-              <a:t>4/3/2024</a:t>
+              <a:t>4/11/2024</a:t>
             </a:fld>
             <a:endParaRPr lang="en-US" dirty="0"/>
           </a:p>
@@ -1927,7 +2164,7 @@
           <a:p>
             <a:fld id="{F70EA678-BCEF-4C66-9D01-277C4F939508}" type="datetimeFigureOut">
               <a:rPr lang="en-US" smtClean="0"/>
-              <a:t>4/3/2024</a:t>
+              <a:t>4/11/2024</a:t>
             </a:fld>
             <a:endParaRPr lang="en-US" dirty="0"/>
           </a:p>
@@ -2068,7 +2305,7 @@
           <a:p>
             <a:fld id="{F70EA678-BCEF-4C66-9D01-277C4F939508}" type="datetimeFigureOut">
               <a:rPr lang="en-US" smtClean="0"/>
-              <a:t>4/3/2024</a:t>
+              <a:t>4/11/2024</a:t>
             </a:fld>
             <a:endParaRPr lang="en-US" dirty="0"/>
           </a:p>
@@ -2181,7 +2418,7 @@
           <a:p>
             <a:fld id="{F70EA678-BCEF-4C66-9D01-277C4F939508}" type="datetimeFigureOut">
               <a:rPr lang="en-US" smtClean="0"/>
-              <a:t>4/3/2024</a:t>
+              <a:t>4/11/2024</a:t>
             </a:fld>
             <a:endParaRPr lang="en-US" dirty="0"/>
           </a:p>
@@ -2492,7 +2729,7 @@
           <a:p>
             <a:fld id="{F70EA678-BCEF-4C66-9D01-277C4F939508}" type="datetimeFigureOut">
               <a:rPr lang="en-US" smtClean="0"/>
-              <a:t>4/3/2024</a:t>
+              <a:t>4/11/2024</a:t>
             </a:fld>
             <a:endParaRPr lang="en-US" dirty="0"/>
           </a:p>
@@ -2780,7 +3017,7 @@
           <a:p>
             <a:fld id="{F70EA678-BCEF-4C66-9D01-277C4F939508}" type="datetimeFigureOut">
               <a:rPr lang="en-US" smtClean="0"/>
-              <a:t>4/3/2024</a:t>
+              <a:t>4/11/2024</a:t>
             </a:fld>
             <a:endParaRPr lang="en-US" dirty="0"/>
           </a:p>
@@ -3021,7 +3258,7 @@
           <a:p>
             <a:fld id="{F70EA678-BCEF-4C66-9D01-277C4F939508}" type="datetimeFigureOut">
               <a:rPr lang="en-US" smtClean="0"/>
-              <a:t>4/3/2024</a:t>
+              <a:t>4/11/2024</a:t>
             </a:fld>
             <a:endParaRPr lang="en-US" dirty="0"/>
           </a:p>
@@ -3766,6 +4003,934 @@
 </p:sld>
 </file>
 
+<file path=ppt/slides/slide2.xml><?xml version="1.0" encoding="utf-8"?>
+<p:sld xmlns:a="http://schemas.openxmlformats.org/drawingml/2006/main" xmlns:r="http://schemas.openxmlformats.org/officeDocument/2006/relationships" xmlns:p="http://schemas.openxmlformats.org/presentationml/2006/main">
+  <p:cSld>
+    <p:spTree>
+      <p:nvGrpSpPr>
+        <p:cNvPr id="1" name=""/>
+        <p:cNvGrpSpPr/>
+        <p:nvPr/>
+      </p:nvGrpSpPr>
+      <p:grpSpPr>
+        <a:xfrm>
+          <a:off x="0" y="0"/>
+          <a:ext cx="0" cy="0"/>
+          <a:chOff x="0" y="0"/>
+          <a:chExt cx="0" cy="0"/>
+        </a:xfrm>
+      </p:grpSpPr>
+      <p:pic>
+        <p:nvPicPr>
+          <p:cNvPr id="15" name="Picture 14">
+            <a:extLst>
+              <a:ext uri="{FF2B5EF4-FFF2-40B4-BE49-F238E27FC236}">
+                <a16:creationId xmlns:a16="http://schemas.microsoft.com/office/drawing/2014/main" id="{7646A4C5-60E3-3CE2-8539-A6164495BD32}"/>
+              </a:ext>
+            </a:extLst>
+          </p:cNvPr>
+          <p:cNvPicPr>
+            <a:picLocks noChangeAspect="1"/>
+          </p:cNvPicPr>
+          <p:nvPr/>
+        </p:nvPicPr>
+        <p:blipFill rotWithShape="1">
+          <a:blip r:embed="rId2">
+            <a:extLst>
+              <a:ext uri="{28A0092B-C50C-407E-A947-70E740481C1C}">
+                <a14:useLocalDpi xmlns:a14="http://schemas.microsoft.com/office/drawing/2010/main" val="0"/>
+              </a:ext>
+            </a:extLst>
+          </a:blip>
+          <a:srcRect l="90532" t="3148" r="-1626" b="10296"/>
+          <a:stretch/>
+        </p:blipFill>
+        <p:spPr>
+          <a:xfrm>
+            <a:off x="9208009" y="546853"/>
+            <a:ext cx="911349" cy="5332738"/>
+          </a:xfrm>
+          <a:prstGeom prst="rect">
+            <a:avLst/>
+          </a:prstGeom>
+        </p:spPr>
+      </p:pic>
+      <p:pic>
+        <p:nvPicPr>
+          <p:cNvPr id="14" name="Picture 13">
+            <a:extLst>
+              <a:ext uri="{FF2B5EF4-FFF2-40B4-BE49-F238E27FC236}">
+                <a16:creationId xmlns:a16="http://schemas.microsoft.com/office/drawing/2014/main" id="{79DF00AC-798B-DA58-3501-283A44C603DA}"/>
+              </a:ext>
+            </a:extLst>
+          </p:cNvPr>
+          <p:cNvPicPr>
+            <a:picLocks noChangeAspect="1"/>
+          </p:cNvPicPr>
+          <p:nvPr/>
+        </p:nvPicPr>
+        <p:blipFill rotWithShape="1">
+          <a:blip r:embed="rId2">
+            <a:extLst>
+              <a:ext uri="{28A0092B-C50C-407E-A947-70E740481C1C}">
+                <a14:useLocalDpi xmlns:a14="http://schemas.microsoft.com/office/drawing/2010/main" val="0"/>
+              </a:ext>
+            </a:extLst>
+          </a:blip>
+          <a:srcRect l="-906" r="89812"/>
+          <a:stretch/>
+        </p:blipFill>
+        <p:spPr>
+          <a:xfrm>
+            <a:off x="2377253" y="348473"/>
+            <a:ext cx="911349" cy="6161053"/>
+          </a:xfrm>
+          <a:prstGeom prst="rect">
+            <a:avLst/>
+          </a:prstGeom>
+        </p:spPr>
+      </p:pic>
+      <p:pic>
+        <p:nvPicPr>
+          <p:cNvPr id="3" name="Picture 2">
+            <a:extLst>
+              <a:ext uri="{FF2B5EF4-FFF2-40B4-BE49-F238E27FC236}">
+                <a16:creationId xmlns:a16="http://schemas.microsoft.com/office/drawing/2014/main" id="{E5183A98-1FE4-4491-99B2-B6AFB6E47DF4}"/>
+              </a:ext>
+            </a:extLst>
+          </p:cNvPr>
+          <p:cNvPicPr>
+            <a:picLocks noChangeAspect="1"/>
+          </p:cNvPicPr>
+          <p:nvPr/>
+        </p:nvPicPr>
+        <p:blipFill rotWithShape="1">
+          <a:blip r:embed="rId2">
+            <a:extLst>
+              <a:ext uri="{28A0092B-C50C-407E-A947-70E740481C1C}">
+                <a14:useLocalDpi xmlns:a14="http://schemas.microsoft.com/office/drawing/2010/main" val="0"/>
+              </a:ext>
+            </a:extLst>
+          </a:blip>
+          <a:srcRect l="11857" r="12117"/>
+          <a:stretch/>
+        </p:blipFill>
+        <p:spPr>
+          <a:xfrm>
+            <a:off x="2962657" y="348473"/>
+            <a:ext cx="6245352" cy="6161053"/>
+          </a:xfrm>
+          <a:prstGeom prst="rect">
+            <a:avLst/>
+          </a:prstGeom>
+        </p:spPr>
+      </p:pic>
+      <p:sp>
+        <p:nvSpPr>
+          <p:cNvPr id="4" name="TextBox 3">
+            <a:extLst>
+              <a:ext uri="{FF2B5EF4-FFF2-40B4-BE49-F238E27FC236}">
+                <a16:creationId xmlns:a16="http://schemas.microsoft.com/office/drawing/2014/main" id="{3329508D-306F-FED8-4AA0-BBC25E6D7F28}"/>
+              </a:ext>
+            </a:extLst>
+          </p:cNvPr>
+          <p:cNvSpPr txBox="1"/>
+          <p:nvPr/>
+        </p:nvSpPr>
+        <p:spPr>
+          <a:xfrm>
+            <a:off x="3145441" y="618220"/>
+            <a:ext cx="1014984" cy="307777"/>
+          </a:xfrm>
+          <a:prstGeom prst="rect">
+            <a:avLst/>
+          </a:prstGeom>
+          <a:noFill/>
+        </p:spPr>
+        <p:txBody>
+          <a:bodyPr wrap="square" rtlCol="0">
+            <a:spAutoFit/>
+          </a:bodyPr>
+          <a:lstStyle/>
+          <a:p>
+            <a:r>
+              <a:rPr lang="en-US" sz="1400" dirty="0"/>
+              <a:t>Pre-Fire</a:t>
+            </a:r>
+          </a:p>
+        </p:txBody>
+      </p:sp>
+      <p:sp>
+        <p:nvSpPr>
+          <p:cNvPr id="5" name="TextBox 4">
+            <a:extLst>
+              <a:ext uri="{FF2B5EF4-FFF2-40B4-BE49-F238E27FC236}">
+                <a16:creationId xmlns:a16="http://schemas.microsoft.com/office/drawing/2014/main" id="{51FAC376-B3E3-CE58-81F1-FEBDB7B6B1E8}"/>
+              </a:ext>
+            </a:extLst>
+          </p:cNvPr>
+          <p:cNvSpPr txBox="1"/>
+          <p:nvPr/>
+        </p:nvSpPr>
+        <p:spPr>
+          <a:xfrm>
+            <a:off x="6557772" y="618220"/>
+            <a:ext cx="1014984" cy="307777"/>
+          </a:xfrm>
+          <a:prstGeom prst="rect">
+            <a:avLst/>
+          </a:prstGeom>
+          <a:noFill/>
+        </p:spPr>
+        <p:txBody>
+          <a:bodyPr wrap="square" rtlCol="0">
+            <a:spAutoFit/>
+          </a:bodyPr>
+          <a:lstStyle/>
+          <a:p>
+            <a:r>
+              <a:rPr lang="en-US" sz="1400" dirty="0"/>
+              <a:t>Post-Fire</a:t>
+            </a:r>
+          </a:p>
+        </p:txBody>
+      </p:sp>
+      <p:sp>
+        <p:nvSpPr>
+          <p:cNvPr id="6" name="TextBox 5">
+            <a:extLst>
+              <a:ext uri="{FF2B5EF4-FFF2-40B4-BE49-F238E27FC236}">
+                <a16:creationId xmlns:a16="http://schemas.microsoft.com/office/drawing/2014/main" id="{4B4BAF50-9A65-EBD8-D980-34AB2F9295DD}"/>
+              </a:ext>
+            </a:extLst>
+          </p:cNvPr>
+          <p:cNvSpPr txBox="1"/>
+          <p:nvPr/>
+        </p:nvSpPr>
+        <p:spPr>
+          <a:xfrm>
+            <a:off x="4596385" y="3504603"/>
+            <a:ext cx="877824" cy="307777"/>
+          </a:xfrm>
+          <a:prstGeom prst="rect">
+            <a:avLst/>
+          </a:prstGeom>
+          <a:noFill/>
+        </p:spPr>
+        <p:txBody>
+          <a:bodyPr wrap="square" rtlCol="0">
+            <a:spAutoFit/>
+          </a:bodyPr>
+          <a:lstStyle/>
+          <a:p>
+            <a:r>
+              <a:rPr lang="en-US" sz="1400" dirty="0">
+                <a:solidFill>
+                  <a:srgbClr val="FF0000"/>
+                </a:solidFill>
+              </a:rPr>
+              <a:t>- 14.7%</a:t>
+            </a:r>
+          </a:p>
+        </p:txBody>
+      </p:sp>
+      <p:sp>
+        <p:nvSpPr>
+          <p:cNvPr id="7" name="TextBox 6">
+            <a:extLst>
+              <a:ext uri="{FF2B5EF4-FFF2-40B4-BE49-F238E27FC236}">
+                <a16:creationId xmlns:a16="http://schemas.microsoft.com/office/drawing/2014/main" id="{5A3554D5-328E-8E2D-95FA-34B66B4A7190}"/>
+              </a:ext>
+            </a:extLst>
+          </p:cNvPr>
+          <p:cNvSpPr txBox="1"/>
+          <p:nvPr/>
+        </p:nvSpPr>
+        <p:spPr>
+          <a:xfrm>
+            <a:off x="5522788" y="4485369"/>
+            <a:ext cx="877824" cy="307777"/>
+          </a:xfrm>
+          <a:prstGeom prst="rect">
+            <a:avLst/>
+          </a:prstGeom>
+          <a:noFill/>
+        </p:spPr>
+        <p:txBody>
+          <a:bodyPr wrap="square" rtlCol="0">
+            <a:spAutoFit/>
+          </a:bodyPr>
+          <a:lstStyle/>
+          <a:p>
+            <a:r>
+              <a:rPr lang="en-US" sz="1400" dirty="0">
+                <a:solidFill>
+                  <a:srgbClr val="FF0000"/>
+                </a:solidFill>
+              </a:rPr>
+              <a:t>- 47.2%</a:t>
+            </a:r>
+          </a:p>
+        </p:txBody>
+      </p:sp>
+      <p:sp>
+        <p:nvSpPr>
+          <p:cNvPr id="10" name="TextBox 9">
+            <a:extLst>
+              <a:ext uri="{FF2B5EF4-FFF2-40B4-BE49-F238E27FC236}">
+                <a16:creationId xmlns:a16="http://schemas.microsoft.com/office/drawing/2014/main" id="{08E5834A-762C-C97E-6C17-126C4BD7BA1A}"/>
+              </a:ext>
+            </a:extLst>
+          </p:cNvPr>
+          <p:cNvSpPr txBox="1"/>
+          <p:nvPr/>
+        </p:nvSpPr>
+        <p:spPr>
+          <a:xfrm>
+            <a:off x="8464484" y="4863082"/>
+            <a:ext cx="877824" cy="307777"/>
+          </a:xfrm>
+          <a:prstGeom prst="rect">
+            <a:avLst/>
+          </a:prstGeom>
+          <a:noFill/>
+        </p:spPr>
+        <p:txBody>
+          <a:bodyPr wrap="square" rtlCol="0">
+            <a:spAutoFit/>
+          </a:bodyPr>
+          <a:lstStyle/>
+          <a:p>
+            <a:r>
+              <a:rPr lang="en-US" sz="1400" dirty="0">
+                <a:solidFill>
+                  <a:srgbClr val="FF0000"/>
+                </a:solidFill>
+              </a:rPr>
+              <a:t>- 59%</a:t>
+            </a:r>
+          </a:p>
+        </p:txBody>
+      </p:sp>
+      <p:cxnSp>
+        <p:nvCxnSpPr>
+          <p:cNvPr id="12" name="Straight Connector 11">
+            <a:extLst>
+              <a:ext uri="{FF2B5EF4-FFF2-40B4-BE49-F238E27FC236}">
+                <a16:creationId xmlns:a16="http://schemas.microsoft.com/office/drawing/2014/main" id="{5CE13AF4-6640-CCB0-9007-98AF3D72B520}"/>
+              </a:ext>
+            </a:extLst>
+          </p:cNvPr>
+          <p:cNvCxnSpPr>
+            <a:stCxn id="3" idx="0"/>
+          </p:cNvCxnSpPr>
+          <p:nvPr/>
+        </p:nvCxnSpPr>
+        <p:spPr>
+          <a:xfrm>
+            <a:off x="6085333" y="348473"/>
+            <a:ext cx="10666" cy="6244351"/>
+          </a:xfrm>
+          <a:prstGeom prst="line">
+            <a:avLst/>
+          </a:prstGeom>
+        </p:spPr>
+        <p:style>
+          <a:lnRef idx="1">
+            <a:schemeClr val="accent1"/>
+          </a:lnRef>
+          <a:fillRef idx="0">
+            <a:schemeClr val="accent1"/>
+          </a:fillRef>
+          <a:effectRef idx="0">
+            <a:schemeClr val="accent1"/>
+          </a:effectRef>
+          <a:fontRef idx="minor">
+            <a:schemeClr val="tx1"/>
+          </a:fontRef>
+        </p:style>
+      </p:cxnSp>
+      <p:sp>
+        <p:nvSpPr>
+          <p:cNvPr id="13" name="TextBox 12">
+            <a:extLst>
+              <a:ext uri="{FF2B5EF4-FFF2-40B4-BE49-F238E27FC236}">
+                <a16:creationId xmlns:a16="http://schemas.microsoft.com/office/drawing/2014/main" id="{708BD760-456F-CD60-7D32-3CF4274E05B9}"/>
+              </a:ext>
+            </a:extLst>
+          </p:cNvPr>
+          <p:cNvSpPr txBox="1"/>
+          <p:nvPr/>
+        </p:nvSpPr>
+        <p:spPr>
+          <a:xfrm>
+            <a:off x="6047232" y="5655004"/>
+            <a:ext cx="780287" cy="430887"/>
+          </a:xfrm>
+          <a:prstGeom prst="rect">
+            <a:avLst/>
+          </a:prstGeom>
+          <a:noFill/>
+        </p:spPr>
+        <p:txBody>
+          <a:bodyPr wrap="square" rtlCol="0">
+            <a:spAutoFit/>
+          </a:bodyPr>
+          <a:lstStyle/>
+          <a:p>
+            <a:r>
+              <a:rPr lang="en-US" sz="1100" dirty="0"/>
+              <a:t>*2 years post-burn</a:t>
+            </a:r>
+          </a:p>
+        </p:txBody>
+      </p:sp>
+      <p:sp>
+        <p:nvSpPr>
+          <p:cNvPr id="16" name="TextBox 15">
+            <a:extLst>
+              <a:ext uri="{FF2B5EF4-FFF2-40B4-BE49-F238E27FC236}">
+                <a16:creationId xmlns:a16="http://schemas.microsoft.com/office/drawing/2014/main" id="{49A9FDCD-E610-AF2D-BD35-9808F883D089}"/>
+              </a:ext>
+            </a:extLst>
+          </p:cNvPr>
+          <p:cNvSpPr txBox="1"/>
+          <p:nvPr/>
+        </p:nvSpPr>
+        <p:spPr>
+          <a:xfrm>
+            <a:off x="9325360" y="3429000"/>
+            <a:ext cx="877824" cy="261610"/>
+          </a:xfrm>
+          <a:prstGeom prst="rect">
+            <a:avLst/>
+          </a:prstGeom>
+          <a:noFill/>
+        </p:spPr>
+        <p:txBody>
+          <a:bodyPr wrap="square" rtlCol="0">
+            <a:spAutoFit/>
+          </a:bodyPr>
+          <a:lstStyle/>
+          <a:p>
+            <a:r>
+              <a:rPr lang="en-US" sz="1100" dirty="0"/>
+              <a:t>- 20%</a:t>
+            </a:r>
+          </a:p>
+        </p:txBody>
+      </p:sp>
+      <p:sp>
+        <p:nvSpPr>
+          <p:cNvPr id="17" name="TextBox 16">
+            <a:extLst>
+              <a:ext uri="{FF2B5EF4-FFF2-40B4-BE49-F238E27FC236}">
+                <a16:creationId xmlns:a16="http://schemas.microsoft.com/office/drawing/2014/main" id="{22A413F6-5F2F-1285-1955-26C0F36AB41B}"/>
+              </a:ext>
+            </a:extLst>
+          </p:cNvPr>
+          <p:cNvSpPr txBox="1"/>
+          <p:nvPr/>
+        </p:nvSpPr>
+        <p:spPr>
+          <a:xfrm>
+            <a:off x="9325360" y="4354564"/>
+            <a:ext cx="877824" cy="261610"/>
+          </a:xfrm>
+          <a:prstGeom prst="rect">
+            <a:avLst/>
+          </a:prstGeom>
+          <a:noFill/>
+        </p:spPr>
+        <p:txBody>
+          <a:bodyPr wrap="square" rtlCol="0">
+            <a:spAutoFit/>
+          </a:bodyPr>
+          <a:lstStyle/>
+          <a:p>
+            <a:r>
+              <a:rPr lang="en-US" sz="1100" dirty="0"/>
+              <a:t>- 50%</a:t>
+            </a:r>
+          </a:p>
+        </p:txBody>
+      </p:sp>
+    </p:spTree>
+    <p:extLst>
+      <p:ext uri="{BB962C8B-B14F-4D97-AF65-F5344CB8AC3E}">
+        <p14:creationId xmlns:p14="http://schemas.microsoft.com/office/powerpoint/2010/main" val="342745335"/>
+      </p:ext>
+    </p:extLst>
+  </p:cSld>
+  <p:clrMapOvr>
+    <a:masterClrMapping/>
+  </p:clrMapOvr>
+</p:sld>
+</file>
+
+<file path=ppt/slides/slide3.xml><?xml version="1.0" encoding="utf-8"?>
+<p:sld xmlns:a="http://schemas.openxmlformats.org/drawingml/2006/main" xmlns:r="http://schemas.openxmlformats.org/officeDocument/2006/relationships" xmlns:p="http://schemas.openxmlformats.org/presentationml/2006/main">
+  <p:cSld>
+    <p:spTree>
+      <p:nvGrpSpPr>
+        <p:cNvPr id="1" name=""/>
+        <p:cNvGrpSpPr/>
+        <p:nvPr/>
+      </p:nvGrpSpPr>
+      <p:grpSpPr>
+        <a:xfrm>
+          <a:off x="0" y="0"/>
+          <a:ext cx="0" cy="0"/>
+          <a:chOff x="0" y="0"/>
+          <a:chExt cx="0" cy="0"/>
+        </a:xfrm>
+      </p:grpSpPr>
+      <p:pic>
+        <p:nvPicPr>
+          <p:cNvPr id="3" name="Picture 2">
+            <a:extLst>
+              <a:ext uri="{FF2B5EF4-FFF2-40B4-BE49-F238E27FC236}">
+                <a16:creationId xmlns:a16="http://schemas.microsoft.com/office/drawing/2014/main" id="{98595FB7-B7C4-95A4-72EE-8ACD4411653F}"/>
+              </a:ext>
+            </a:extLst>
+          </p:cNvPr>
+          <p:cNvPicPr>
+            <a:picLocks noGrp="1" noRot="1" noChangeAspect="1" noMove="1" noResize="1" noEditPoints="1" noAdjustHandles="1" noChangeArrowheads="1" noChangeShapeType="1" noCrop="1"/>
+          </p:cNvPicPr>
+          <p:nvPr/>
+        </p:nvPicPr>
+        <p:blipFill rotWithShape="1">
+          <a:blip r:embed="rId2">
+            <a:extLst>
+              <a:ext uri="{28A0092B-C50C-407E-A947-70E740481C1C}">
+                <a14:useLocalDpi xmlns:a14="http://schemas.microsoft.com/office/drawing/2010/main" val="0"/>
+              </a:ext>
+            </a:extLst>
+          </a:blip>
+          <a:srcRect l="15906" r="19470"/>
+          <a:stretch/>
+        </p:blipFill>
+        <p:spPr>
+          <a:xfrm>
+            <a:off x="3757961" y="509708"/>
+            <a:ext cx="5218771" cy="6056674"/>
+          </a:xfrm>
+          <a:prstGeom prst="rect">
+            <a:avLst/>
+          </a:prstGeom>
+        </p:spPr>
+      </p:pic>
+      <p:pic>
+        <p:nvPicPr>
+          <p:cNvPr id="4" name="Picture 3">
+            <a:extLst>
+              <a:ext uri="{FF2B5EF4-FFF2-40B4-BE49-F238E27FC236}">
+                <a16:creationId xmlns:a16="http://schemas.microsoft.com/office/drawing/2014/main" id="{3FE76828-6482-C5F7-9876-F1D66BAAB3CF}"/>
+              </a:ext>
+            </a:extLst>
+          </p:cNvPr>
+          <p:cNvPicPr>
+            <a:picLocks noGrp="1" noRot="1" noChangeAspect="1" noMove="1" noResize="1" noEditPoints="1" noAdjustHandles="1" noChangeArrowheads="1" noChangeShapeType="1" noCrop="1"/>
+          </p:cNvPicPr>
+          <p:nvPr/>
+        </p:nvPicPr>
+        <p:blipFill rotWithShape="1">
+          <a:blip r:embed="rId2">
+            <a:extLst>
+              <a:ext uri="{28A0092B-C50C-407E-A947-70E740481C1C}">
+                <a14:useLocalDpi xmlns:a14="http://schemas.microsoft.com/office/drawing/2010/main" val="0"/>
+              </a:ext>
+            </a:extLst>
+          </a:blip>
+          <a:srcRect l="-1" r="83709" b="8112"/>
+          <a:stretch/>
+        </p:blipFill>
+        <p:spPr>
+          <a:xfrm>
+            <a:off x="2442338" y="509708"/>
+            <a:ext cx="1315623" cy="5565402"/>
+          </a:xfrm>
+          <a:prstGeom prst="rect">
+            <a:avLst/>
+          </a:prstGeom>
+        </p:spPr>
+      </p:pic>
+      <p:pic>
+        <p:nvPicPr>
+          <p:cNvPr id="5" name="Picture 4">
+            <a:extLst>
+              <a:ext uri="{FF2B5EF4-FFF2-40B4-BE49-F238E27FC236}">
+                <a16:creationId xmlns:a16="http://schemas.microsoft.com/office/drawing/2014/main" id="{7FF53BED-13E0-32E4-203C-3189A5A9BD5F}"/>
+              </a:ext>
+            </a:extLst>
+          </p:cNvPr>
+          <p:cNvPicPr>
+            <a:picLocks noGrp="1" noRot="1" noChangeAspect="1" noMove="1" noResize="1" noEditPoints="1" noAdjustHandles="1" noChangeArrowheads="1" noChangeShapeType="1" noCrop="1"/>
+          </p:cNvPicPr>
+          <p:nvPr/>
+        </p:nvPicPr>
+        <p:blipFill rotWithShape="1">
+          <a:blip r:embed="rId2">
+            <a:extLst>
+              <a:ext uri="{28A0092B-C50C-407E-A947-70E740481C1C}">
+                <a14:useLocalDpi xmlns:a14="http://schemas.microsoft.com/office/drawing/2010/main" val="0"/>
+              </a:ext>
+            </a:extLst>
+          </a:blip>
+          <a:srcRect l="79195" r="1" b="10628"/>
+          <a:stretch/>
+        </p:blipFill>
+        <p:spPr>
+          <a:xfrm>
+            <a:off x="8976732" y="509708"/>
+            <a:ext cx="1680116" cy="5413002"/>
+          </a:xfrm>
+          <a:prstGeom prst="rect">
+            <a:avLst/>
+          </a:prstGeom>
+        </p:spPr>
+      </p:pic>
+      <p:sp>
+        <p:nvSpPr>
+          <p:cNvPr id="6" name="TextBox 5">
+            <a:extLst>
+              <a:ext uri="{FF2B5EF4-FFF2-40B4-BE49-F238E27FC236}">
+                <a16:creationId xmlns:a16="http://schemas.microsoft.com/office/drawing/2014/main" id="{29078BEE-41E1-F912-CF47-777A87313178}"/>
+              </a:ext>
+            </a:extLst>
+          </p:cNvPr>
+          <p:cNvSpPr txBox="1"/>
+          <p:nvPr/>
+        </p:nvSpPr>
+        <p:spPr>
+          <a:xfrm>
+            <a:off x="9310750" y="1200653"/>
+            <a:ext cx="877824" cy="261610"/>
+          </a:xfrm>
+          <a:prstGeom prst="rect">
+            <a:avLst/>
+          </a:prstGeom>
+          <a:noFill/>
+        </p:spPr>
+        <p:txBody>
+          <a:bodyPr wrap="square" rtlCol="0">
+            <a:spAutoFit/>
+          </a:bodyPr>
+          <a:lstStyle/>
+          <a:p>
+            <a:r>
+              <a:rPr lang="en-US" sz="1100" dirty="0"/>
+              <a:t>0%</a:t>
+            </a:r>
+          </a:p>
+        </p:txBody>
+      </p:sp>
+      <p:sp>
+        <p:nvSpPr>
+          <p:cNvPr id="7" name="TextBox 6">
+            <a:extLst>
+              <a:ext uri="{FF2B5EF4-FFF2-40B4-BE49-F238E27FC236}">
+                <a16:creationId xmlns:a16="http://schemas.microsoft.com/office/drawing/2014/main" id="{80E8490C-D853-38C2-D50C-C94593526263}"/>
+              </a:ext>
+            </a:extLst>
+          </p:cNvPr>
+          <p:cNvSpPr txBox="1"/>
+          <p:nvPr/>
+        </p:nvSpPr>
+        <p:spPr>
+          <a:xfrm>
+            <a:off x="9241544" y="1462263"/>
+            <a:ext cx="877824" cy="261610"/>
+          </a:xfrm>
+          <a:prstGeom prst="rect">
+            <a:avLst/>
+          </a:prstGeom>
+          <a:noFill/>
+        </p:spPr>
+        <p:txBody>
+          <a:bodyPr wrap="square" rtlCol="0">
+            <a:spAutoFit/>
+          </a:bodyPr>
+          <a:lstStyle/>
+          <a:p>
+            <a:r>
+              <a:rPr lang="en-US" sz="1100" dirty="0"/>
+              <a:t>- 10%</a:t>
+            </a:r>
+          </a:p>
+        </p:txBody>
+      </p:sp>
+      <p:sp>
+        <p:nvSpPr>
+          <p:cNvPr id="9" name="TextBox 8">
+            <a:extLst>
+              <a:ext uri="{FF2B5EF4-FFF2-40B4-BE49-F238E27FC236}">
+                <a16:creationId xmlns:a16="http://schemas.microsoft.com/office/drawing/2014/main" id="{9F5F4D2A-5AB3-0AE8-1739-E804C8A57B84}"/>
+              </a:ext>
+            </a:extLst>
+          </p:cNvPr>
+          <p:cNvSpPr txBox="1"/>
+          <p:nvPr/>
+        </p:nvSpPr>
+        <p:spPr>
+          <a:xfrm>
+            <a:off x="4058600" y="810244"/>
+            <a:ext cx="1014984" cy="261610"/>
+          </a:xfrm>
+          <a:prstGeom prst="rect">
+            <a:avLst/>
+          </a:prstGeom>
+          <a:noFill/>
+        </p:spPr>
+        <p:txBody>
+          <a:bodyPr wrap="square" rtlCol="0">
+            <a:spAutoFit/>
+          </a:bodyPr>
+          <a:lstStyle/>
+          <a:p>
+            <a:r>
+              <a:rPr lang="en-US" sz="1100" dirty="0"/>
+              <a:t>Pre-Fire</a:t>
+            </a:r>
+          </a:p>
+        </p:txBody>
+      </p:sp>
+      <p:sp>
+        <p:nvSpPr>
+          <p:cNvPr id="10" name="TextBox 9">
+            <a:extLst>
+              <a:ext uri="{FF2B5EF4-FFF2-40B4-BE49-F238E27FC236}">
+                <a16:creationId xmlns:a16="http://schemas.microsoft.com/office/drawing/2014/main" id="{3E28EB1E-3606-B82C-DA5A-2F4F2F811E4D}"/>
+              </a:ext>
+            </a:extLst>
+          </p:cNvPr>
+          <p:cNvSpPr txBox="1"/>
+          <p:nvPr/>
+        </p:nvSpPr>
+        <p:spPr>
+          <a:xfrm>
+            <a:off x="7228520" y="818605"/>
+            <a:ext cx="1014984" cy="261610"/>
+          </a:xfrm>
+          <a:prstGeom prst="rect">
+            <a:avLst/>
+          </a:prstGeom>
+          <a:noFill/>
+        </p:spPr>
+        <p:txBody>
+          <a:bodyPr wrap="square" rtlCol="0">
+            <a:spAutoFit/>
+          </a:bodyPr>
+          <a:lstStyle/>
+          <a:p>
+            <a:r>
+              <a:rPr lang="en-US" sz="1100" dirty="0"/>
+              <a:t>Post-Fire</a:t>
+            </a:r>
+          </a:p>
+        </p:txBody>
+      </p:sp>
+      <p:sp>
+        <p:nvSpPr>
+          <p:cNvPr id="11" name="TextBox 10">
+            <a:extLst>
+              <a:ext uri="{FF2B5EF4-FFF2-40B4-BE49-F238E27FC236}">
+                <a16:creationId xmlns:a16="http://schemas.microsoft.com/office/drawing/2014/main" id="{E4C8FAF2-5299-EEC8-A32B-D28FBF429AC4}"/>
+              </a:ext>
+            </a:extLst>
+          </p:cNvPr>
+          <p:cNvSpPr txBox="1"/>
+          <p:nvPr/>
+        </p:nvSpPr>
+        <p:spPr>
+          <a:xfrm>
+            <a:off x="5489522" y="2425611"/>
+            <a:ext cx="877824" cy="307777"/>
+          </a:xfrm>
+          <a:prstGeom prst="rect">
+            <a:avLst/>
+          </a:prstGeom>
+          <a:noFill/>
+        </p:spPr>
+        <p:txBody>
+          <a:bodyPr wrap="square" rtlCol="0">
+            <a:spAutoFit/>
+          </a:bodyPr>
+          <a:lstStyle/>
+          <a:p>
+            <a:r>
+              <a:rPr lang="en-US" sz="1400" dirty="0">
+                <a:solidFill>
+                  <a:srgbClr val="FF0000"/>
+                </a:solidFill>
+              </a:rPr>
+              <a:t>- 42.6%</a:t>
+            </a:r>
+          </a:p>
+        </p:txBody>
+      </p:sp>
+      <p:sp>
+        <p:nvSpPr>
+          <p:cNvPr id="12" name="TextBox 11">
+            <a:extLst>
+              <a:ext uri="{FF2B5EF4-FFF2-40B4-BE49-F238E27FC236}">
+                <a16:creationId xmlns:a16="http://schemas.microsoft.com/office/drawing/2014/main" id="{666044CE-4E27-A630-7AFE-C039FC4C4033}"/>
+              </a:ext>
+            </a:extLst>
+          </p:cNvPr>
+          <p:cNvSpPr txBox="1"/>
+          <p:nvPr/>
+        </p:nvSpPr>
+        <p:spPr>
+          <a:xfrm>
+            <a:off x="6407044" y="2598678"/>
+            <a:ext cx="877824" cy="307777"/>
+          </a:xfrm>
+          <a:prstGeom prst="rect">
+            <a:avLst/>
+          </a:prstGeom>
+          <a:noFill/>
+        </p:spPr>
+        <p:txBody>
+          <a:bodyPr wrap="square" rtlCol="0">
+            <a:spAutoFit/>
+          </a:bodyPr>
+          <a:lstStyle/>
+          <a:p>
+            <a:r>
+              <a:rPr lang="en-US" sz="1400" dirty="0">
+                <a:solidFill>
+                  <a:srgbClr val="FF0000"/>
+                </a:solidFill>
+              </a:rPr>
+              <a:t>- 45.9%</a:t>
+            </a:r>
+          </a:p>
+        </p:txBody>
+      </p:sp>
+      <p:sp>
+        <p:nvSpPr>
+          <p:cNvPr id="13" name="TextBox 12">
+            <a:extLst>
+              <a:ext uri="{FF2B5EF4-FFF2-40B4-BE49-F238E27FC236}">
+                <a16:creationId xmlns:a16="http://schemas.microsoft.com/office/drawing/2014/main" id="{00F128A9-57CD-9869-5E8F-F5BE9F457A3B}"/>
+              </a:ext>
+            </a:extLst>
+          </p:cNvPr>
+          <p:cNvSpPr txBox="1"/>
+          <p:nvPr/>
+        </p:nvSpPr>
+        <p:spPr>
+          <a:xfrm>
+            <a:off x="8243504" y="3062320"/>
+            <a:ext cx="877824" cy="307777"/>
+          </a:xfrm>
+          <a:prstGeom prst="rect">
+            <a:avLst/>
+          </a:prstGeom>
+          <a:noFill/>
+        </p:spPr>
+        <p:txBody>
+          <a:bodyPr wrap="square" rtlCol="0">
+            <a:spAutoFit/>
+          </a:bodyPr>
+          <a:lstStyle/>
+          <a:p>
+            <a:r>
+              <a:rPr lang="en-US" sz="1400" dirty="0">
+                <a:solidFill>
+                  <a:srgbClr val="FF0000"/>
+                </a:solidFill>
+              </a:rPr>
+              <a:t>- 60.4%</a:t>
+            </a:r>
+          </a:p>
+        </p:txBody>
+      </p:sp>
+      <p:cxnSp>
+        <p:nvCxnSpPr>
+          <p:cNvPr id="14" name="Straight Connector 13">
+            <a:extLst>
+              <a:ext uri="{FF2B5EF4-FFF2-40B4-BE49-F238E27FC236}">
+                <a16:creationId xmlns:a16="http://schemas.microsoft.com/office/drawing/2014/main" id="{E035A26F-9DCB-4201-8763-E95ABC72A2C4}"/>
+              </a:ext>
+            </a:extLst>
+          </p:cNvPr>
+          <p:cNvCxnSpPr/>
+          <p:nvPr/>
+        </p:nvCxnSpPr>
+        <p:spPr>
+          <a:xfrm>
+            <a:off x="6793107" y="291618"/>
+            <a:ext cx="10666" cy="6244351"/>
+          </a:xfrm>
+          <a:prstGeom prst="line">
+            <a:avLst/>
+          </a:prstGeom>
+        </p:spPr>
+        <p:style>
+          <a:lnRef idx="1">
+            <a:schemeClr val="accent1"/>
+          </a:lnRef>
+          <a:fillRef idx="0">
+            <a:schemeClr val="accent1"/>
+          </a:fillRef>
+          <a:effectRef idx="0">
+            <a:schemeClr val="accent1"/>
+          </a:effectRef>
+          <a:fontRef idx="minor">
+            <a:schemeClr val="tx1"/>
+          </a:fontRef>
+        </p:style>
+      </p:cxnSp>
+      <p:sp>
+        <p:nvSpPr>
+          <p:cNvPr id="15" name="TextBox 14">
+            <a:extLst>
+              <a:ext uri="{FF2B5EF4-FFF2-40B4-BE49-F238E27FC236}">
+                <a16:creationId xmlns:a16="http://schemas.microsoft.com/office/drawing/2014/main" id="{52F50A45-5B82-8624-F923-0AFC7D229F1B}"/>
+              </a:ext>
+            </a:extLst>
+          </p:cNvPr>
+          <p:cNvSpPr txBox="1"/>
+          <p:nvPr/>
+        </p:nvSpPr>
+        <p:spPr>
+          <a:xfrm>
+            <a:off x="6762775" y="5707266"/>
+            <a:ext cx="780287" cy="430887"/>
+          </a:xfrm>
+          <a:prstGeom prst="rect">
+            <a:avLst/>
+          </a:prstGeom>
+          <a:noFill/>
+        </p:spPr>
+        <p:txBody>
+          <a:bodyPr wrap="square" rtlCol="0">
+            <a:spAutoFit/>
+          </a:bodyPr>
+          <a:lstStyle/>
+          <a:p>
+            <a:r>
+              <a:rPr lang="en-US" sz="1100" dirty="0"/>
+              <a:t>*5 years post-burn</a:t>
+            </a:r>
+          </a:p>
+        </p:txBody>
+      </p:sp>
+    </p:spTree>
+    <p:extLst>
+      <p:ext uri="{BB962C8B-B14F-4D97-AF65-F5344CB8AC3E}">
+        <p14:creationId xmlns:p14="http://schemas.microsoft.com/office/powerpoint/2010/main" val="2843270418"/>
+      </p:ext>
+    </p:extLst>
+  </p:cSld>
+  <p:clrMapOvr>
+    <a:masterClrMapping/>
+  </p:clrMapOvr>
+</p:sld>
+</file>
+
 <file path=ppt/theme/theme1.xml><?xml version="1.0" encoding="utf-8"?>
 <a:theme xmlns:a="http://schemas.openxmlformats.org/drawingml/2006/main" name="Office Theme">
   <a:themeElements>

</xml_diff>